<commit_message>
add 211001 && mod hong
</commit_message>
<xml_diff>
--- a/210616/project/앱소개_0616.pptx
+++ b/210616/project/앱소개_0616.pptx
@@ -113,7 +113,7 @@
   </p:defaultTextStyle>
   <p:extLst>
     <p:ext uri="{EFAFB233-063F-42B5-8137-9DF3F51BA10A}">
-      <p15:sldGuideLst xmlns:p15="http://schemas.microsoft.com/office/powerpoint/2012/main" xmlns=""/>
+      <p15:sldGuideLst xmlns="" xmlns:p15="http://schemas.microsoft.com/office/powerpoint/2012/main"/>
     </p:ext>
   </p:extLst>
 </p:presentation>
@@ -305,7 +305,7 @@
           <a:p>
             <a:fld id="{4AAD347D-5ACD-4C99-B74B-A9C85AD731AF}" type="datetimeFigureOut">
               <a:rPr lang="en-US" dirty="0"/>
-              <a:t>6/17/2021</a:t>
+              <a:t>10/1/2021</a:t>
             </a:fld>
             <a:endParaRPr lang="en-US" dirty="0"/>
           </a:p>
@@ -575,7 +575,7 @@
           <a:p>
             <a:fld id="{4509A250-FF31-4206-8172-F9D3106AACB1}" type="datetimeFigureOut">
               <a:rPr lang="en-US" dirty="0"/>
-              <a:t>6/17/2021</a:t>
+              <a:t>10/1/2021</a:t>
             </a:fld>
             <a:endParaRPr lang="en-US" dirty="0"/>
           </a:p>
@@ -764,7 +764,7 @@
           <a:p>
             <a:fld id="{4509A250-FF31-4206-8172-F9D3106AACB1}" type="datetimeFigureOut">
               <a:rPr lang="en-US" dirty="0"/>
-              <a:t>6/17/2021</a:t>
+              <a:t>10/1/2021</a:t>
             </a:fld>
             <a:endParaRPr lang="en-US" dirty="0"/>
           </a:p>
@@ -1032,7 +1032,7 @@
           <a:p>
             <a:fld id="{4509A250-FF31-4206-8172-F9D3106AACB1}" type="datetimeFigureOut">
               <a:rPr lang="en-US" dirty="0"/>
-              <a:t>6/17/2021</a:t>
+              <a:t>10/1/2021</a:t>
             </a:fld>
             <a:endParaRPr lang="en-US" dirty="0"/>
           </a:p>
@@ -1368,7 +1368,7 @@
           <a:p>
             <a:fld id="{4509A250-FF31-4206-8172-F9D3106AACB1}" type="datetimeFigureOut">
               <a:rPr lang="en-US" dirty="0"/>
-              <a:t>6/17/2021</a:t>
+              <a:t>10/1/2021</a:t>
             </a:fld>
             <a:endParaRPr lang="en-US" dirty="0"/>
           </a:p>
@@ -1986,7 +1986,7 @@
           <a:p>
             <a:fld id="{4509A250-FF31-4206-8172-F9D3106AACB1}" type="datetimeFigureOut">
               <a:rPr lang="en-US" dirty="0"/>
-              <a:t>6/17/2021</a:t>
+              <a:t>10/1/2021</a:t>
             </a:fld>
             <a:endParaRPr lang="en-US" dirty="0"/>
           </a:p>
@@ -2841,7 +2841,7 @@
           <a:p>
             <a:fld id="{4509A250-FF31-4206-8172-F9D3106AACB1}" type="datetimeFigureOut">
               <a:rPr lang="en-US" dirty="0"/>
-              <a:t>6/17/2021</a:t>
+              <a:t>10/1/2021</a:t>
             </a:fld>
             <a:endParaRPr lang="en-US" dirty="0"/>
           </a:p>
@@ -3006,7 +3006,7 @@
           <a:p>
             <a:fld id="{4509A250-FF31-4206-8172-F9D3106AACB1}" type="datetimeFigureOut">
               <a:rPr lang="en-US" dirty="0"/>
-              <a:t>6/17/2021</a:t>
+              <a:t>10/1/2021</a:t>
             </a:fld>
             <a:endParaRPr lang="en-US" dirty="0"/>
           </a:p>
@@ -3181,7 +3181,7 @@
           <a:p>
             <a:fld id="{4509A250-FF31-4206-8172-F9D3106AACB1}" type="datetimeFigureOut">
               <a:rPr lang="en-US" dirty="0"/>
-              <a:t>6/17/2021</a:t>
+              <a:t>10/1/2021</a:t>
             </a:fld>
             <a:endParaRPr lang="en-US" dirty="0"/>
           </a:p>
@@ -3346,7 +3346,7 @@
           <a:p>
             <a:fld id="{4509A250-FF31-4206-8172-F9D3106AACB1}" type="datetimeFigureOut">
               <a:rPr lang="en-US" dirty="0"/>
-              <a:t>6/17/2021</a:t>
+              <a:t>10/1/2021</a:t>
             </a:fld>
             <a:endParaRPr lang="en-US" dirty="0"/>
           </a:p>
@@ -3588,7 +3588,7 @@
           <a:p>
             <a:fld id="{9796027F-7875-4030-9381-8BD8C4F21935}" type="datetimeFigureOut">
               <a:rPr lang="en-US" dirty="0"/>
-              <a:t>6/17/2021</a:t>
+              <a:t>10/1/2021</a:t>
             </a:fld>
             <a:endParaRPr lang="en-US" dirty="0"/>
           </a:p>
@@ -3875,7 +3875,7 @@
           <a:p>
             <a:fld id="{9796027F-7875-4030-9381-8BD8C4F21935}" type="datetimeFigureOut">
               <a:rPr lang="en-US" dirty="0"/>
-              <a:t>6/17/2021</a:t>
+              <a:t>10/1/2021</a:t>
             </a:fld>
             <a:endParaRPr lang="en-US" dirty="0"/>
           </a:p>
@@ -4314,7 +4314,7 @@
           <a:p>
             <a:fld id="{9796027F-7875-4030-9381-8BD8C4F21935}" type="datetimeFigureOut">
               <a:rPr lang="en-US" dirty="0"/>
-              <a:t>6/17/2021</a:t>
+              <a:t>10/1/2021</a:t>
             </a:fld>
             <a:endParaRPr lang="en-US" dirty="0"/>
           </a:p>
@@ -4427,7 +4427,7 @@
           <a:p>
             <a:fld id="{4509A250-FF31-4206-8172-F9D3106AACB1}" type="datetimeFigureOut">
               <a:rPr lang="en-US" dirty="0"/>
-              <a:t>6/17/2021</a:t>
+              <a:t>10/1/2021</a:t>
             </a:fld>
             <a:endParaRPr lang="en-US" dirty="0"/>
           </a:p>
@@ -4517,7 +4517,7 @@
           <a:p>
             <a:fld id="{4509A250-FF31-4206-8172-F9D3106AACB1}" type="datetimeFigureOut">
               <a:rPr lang="en-US" dirty="0"/>
-              <a:t>6/17/2021</a:t>
+              <a:t>10/1/2021</a:t>
             </a:fld>
             <a:endParaRPr lang="en-US" dirty="0"/>
           </a:p>
@@ -4791,7 +4791,7 @@
           <a:p>
             <a:fld id="{4509A250-FF31-4206-8172-F9D3106AACB1}" type="datetimeFigureOut">
               <a:rPr lang="en-US" dirty="0"/>
-              <a:t>6/17/2021</a:t>
+              <a:t>10/1/2021</a:t>
             </a:fld>
             <a:endParaRPr lang="en-US" dirty="0"/>
           </a:p>
@@ -5061,7 +5061,7 @@
           <a:p>
             <a:fld id="{4509A250-FF31-4206-8172-F9D3106AACB1}" type="datetimeFigureOut">
               <a:rPr lang="en-US" dirty="0"/>
-              <a:t>6/17/2021</a:t>
+              <a:t>10/1/2021</a:t>
             </a:fld>
             <a:endParaRPr lang="en-US" dirty="0"/>
           </a:p>
@@ -5485,7 +5485,7 @@
           <a:p>
             <a:fld id="{4AAD347D-5ACD-4C99-B74B-A9C85AD731AF}" type="datetimeFigureOut">
               <a:rPr lang="en-US" dirty="0"/>
-              <a:t>6/17/2021</a:t>
+              <a:t>10/1/2021</a:t>
             </a:fld>
             <a:endParaRPr lang="en-US" dirty="0"/>
           </a:p>
@@ -6141,7 +6141,11 @@
             <a:pPr algn="ctr"/>
             <a:r>
               <a:rPr lang="ko-KR" altLang="en-US" dirty="0" smtClean="0"/>
-              <a:t>김태경  현지영  신 진  안현재</a:t>
+              <a:t>⦁⦁⦁ ⦁⦁⦁ ⦁⦁⦁ ⦁⦁</a:t>
+            </a:r>
+            <a:r>
+              <a:rPr lang="ko-KR" altLang="en-US" dirty="0"/>
+              <a:t>⦁</a:t>
             </a:r>
             <a:endParaRPr lang="ko-KR" altLang="en-US" dirty="0"/>
           </a:p>
@@ -9883,7 +9887,7 @@
   <a:extraClrSchemeLst/>
   <a:extLst>
     <a:ext uri="{05A4C25C-085E-4340-85A3-A5531E510DB2}">
-      <thm15:themeFamily xmlns:thm15="http://schemas.microsoft.com/office/thememl/2012/main" xmlns="" name="Ion" id="{B8441ADB-2E43-4AF7-B97A-BD870242C6A8}" vid="{292E63A9-BB86-4E3D-B92A-7223C6510D2E}"/>
+      <thm15:themeFamily xmlns="" xmlns:thm15="http://schemas.microsoft.com/office/thememl/2012/main" name="Ion" id="{B8441ADB-2E43-4AF7-B97A-BD870242C6A8}" vid="{292E63A9-BB86-4E3D-B92A-7223C6510D2E}"/>
     </a:ext>
   </a:extLst>
 </a:theme>

</xml_diff>